<commit_message>
fixed a typo and refined the bio for Sophie Germain
</commit_message>
<xml_diff>
--- a/UKTAG 20210528 MQTT.pptx
+++ b/UKTAG 20210528 MQTT.pptx
@@ -9126,8 +9126,8 @@
         </p:nvSpPr>
         <p:spPr>
           <a:xfrm>
-            <a:off x="1110207" y="1874627"/>
-            <a:ext cx="5741846" cy="3416320"/>
+            <a:off x="1110206" y="1603524"/>
+            <a:ext cx="6707913" cy="3416320"/>
           </a:xfrm>
           <a:prstGeom prst="rect">
             <a:avLst/>
@@ -9446,6 +9446,50 @@
               <a:buChar char="•"/>
             </a:pPr>
             <a:r>
+              <a:rPr lang="fr-CA" dirty="0" err="1">
+                <a:solidFill>
+                  <a:schemeClr val="tx1">
+                    <a:lumMod val="50000"/>
+                    <a:lumOff val="50000"/>
+                  </a:schemeClr>
+                </a:solidFill>
+              </a:rPr>
+              <a:t>Corresponded</a:t>
+            </a:r>
+            <a:r>
+              <a:rPr lang="fr-CA" dirty="0">
+                <a:solidFill>
+                  <a:schemeClr val="tx1">
+                    <a:lumMod val="50000"/>
+                    <a:lumOff val="50000"/>
+                  </a:schemeClr>
+                </a:solidFill>
+              </a:rPr>
+              <a:t> </a:t>
+            </a:r>
+            <a:r>
+              <a:rPr lang="fr-CA" dirty="0" err="1">
+                <a:solidFill>
+                  <a:schemeClr val="tx1">
+                    <a:lumMod val="50000"/>
+                    <a:lumOff val="50000"/>
+                  </a:schemeClr>
+                </a:solidFill>
+              </a:rPr>
+              <a:t>profusely</a:t>
+            </a:r>
+            <a:r>
+              <a:rPr lang="fr-CA" dirty="0">
+                <a:solidFill>
+                  <a:schemeClr val="tx1">
+                    <a:lumMod val="50000"/>
+                    <a:lumOff val="50000"/>
+                  </a:schemeClr>
+                </a:solidFill>
+              </a:rPr>
+              <a:t> </a:t>
+            </a:r>
+            <a:r>
               <a:rPr lang="fr-CA" dirty="0" err="1" smtClean="0">
                 <a:solidFill>
                   <a:schemeClr val="tx1">
@@ -9454,7 +9498,7 @@
                   </a:schemeClr>
                 </a:solidFill>
               </a:rPr>
-              <a:t>Add</a:t>
+              <a:t>with</a:t>
             </a:r>
             <a:r>
               <a:rPr lang="fr-CA" dirty="0" smtClean="0">
@@ -9465,7 +9509,7 @@
                   </a:schemeClr>
                 </a:solidFill>
               </a:rPr>
-              <a:t> to use a </a:t>
+              <a:t> Carl Friedrich Gauss and </a:t>
             </a:r>
             <a:r>
               <a:rPr lang="fr-CA" dirty="0" err="1" smtClean="0">
@@ -9476,6 +9520,50 @@
                   </a:schemeClr>
                 </a:solidFill>
               </a:rPr>
+              <a:t>others</a:t>
+            </a:r>
+            <a:r>
+              <a:rPr lang="fr-CA" dirty="0" smtClean="0">
+                <a:solidFill>
+                  <a:schemeClr val="tx1">
+                    <a:lumMod val="50000"/>
+                    <a:lumOff val="50000"/>
+                  </a:schemeClr>
+                </a:solidFill>
+              </a:rPr>
+              <a:t>, </a:t>
+            </a:r>
+            <a:r>
+              <a:rPr lang="fr-CA" dirty="0" err="1" smtClean="0">
+                <a:solidFill>
+                  <a:schemeClr val="tx1">
+                    <a:lumMod val="50000"/>
+                    <a:lumOff val="50000"/>
+                  </a:schemeClr>
+                </a:solidFill>
+              </a:rPr>
+              <a:t>using</a:t>
+            </a:r>
+            <a:r>
+              <a:rPr lang="fr-CA" dirty="0" smtClean="0">
+                <a:solidFill>
+                  <a:schemeClr val="tx1">
+                    <a:lumMod val="50000"/>
+                    <a:lumOff val="50000"/>
+                  </a:schemeClr>
+                </a:solidFill>
+              </a:rPr>
+              <a:t> the </a:t>
+            </a:r>
+            <a:r>
+              <a:rPr lang="en-CA" dirty="0" smtClean="0">
+                <a:solidFill>
+                  <a:schemeClr val="tx1">
+                    <a:lumMod val="50000"/>
+                    <a:lumOff val="50000"/>
+                  </a:schemeClr>
+                </a:solidFill>
+              </a:rPr>
               <a:t>pseudonym</a:t>
             </a:r>
             <a:r>
@@ -9487,95 +9575,31 @@
                   </a:schemeClr>
                 </a:solidFill>
               </a:rPr>
-              <a:t> to </a:t>
-            </a:r>
-            <a:r>
-              <a:rPr lang="fr-CA" dirty="0" err="1" smtClean="0">
-                <a:solidFill>
-                  <a:schemeClr val="tx1">
-                    <a:lumMod val="50000"/>
-                    <a:lumOff val="50000"/>
-                  </a:schemeClr>
-                </a:solidFill>
-              </a:rPr>
-              <a:t>get</a:t>
-            </a:r>
-            <a:r>
-              <a:rPr lang="fr-CA" dirty="0" smtClean="0">
-                <a:solidFill>
-                  <a:schemeClr val="tx1">
-                    <a:lumMod val="50000"/>
-                    <a:lumOff val="50000"/>
-                  </a:schemeClr>
-                </a:solidFill>
-              </a:rPr>
-              <a:t> in the math </a:t>
-            </a:r>
-            <a:r>
-              <a:rPr lang="fr-CA" dirty="0" err="1" smtClean="0">
-                <a:solidFill>
-                  <a:schemeClr val="tx1">
-                    <a:lumMod val="50000"/>
-                    <a:lumOff val="50000"/>
-                  </a:schemeClr>
-                </a:solidFill>
-              </a:rPr>
-              <a:t>academic</a:t>
-            </a:r>
-            <a:r>
-              <a:rPr lang="fr-CA" dirty="0" smtClean="0">
-                <a:solidFill>
-                  <a:schemeClr val="tx1">
-                    <a:lumMod val="50000"/>
-                    <a:lumOff val="50000"/>
-                  </a:schemeClr>
-                </a:solidFill>
-              </a:rPr>
               <a:t> </a:t>
             </a:r>
             <a:r>
-              <a:rPr lang="fr-CA" dirty="0" err="1" smtClean="0">
-                <a:solidFill>
-                  <a:schemeClr val="tx1">
-                    <a:lumMod val="50000"/>
-                    <a:lumOff val="50000"/>
-                  </a:schemeClr>
-                </a:solidFill>
-              </a:rPr>
-              <a:t>circles</a:t>
-            </a:r>
-            <a:r>
-              <a:rPr lang="fr-CA" dirty="0" smtClean="0">
-                <a:solidFill>
-                  <a:schemeClr val="tx1">
-                    <a:lumMod val="50000"/>
-                    <a:lumOff val="50000"/>
-                  </a:schemeClr>
-                </a:solidFill>
-              </a:rPr>
-              <a:t> (Antoine </a:t>
-            </a:r>
-            <a:r>
-              <a:rPr lang="fr-CA" dirty="0">
-                <a:solidFill>
-                  <a:schemeClr val="tx1">
-                    <a:lumMod val="50000"/>
-                    <a:lumOff val="50000"/>
-                  </a:schemeClr>
+              <a:rPr lang="fr-CA" i="1" dirty="0" smtClean="0">
+                <a:solidFill>
+                  <a:srgbClr val="0070C0"/>
+                </a:solidFill>
+              </a:rPr>
+              <a:t>Antoine </a:t>
+            </a:r>
+            <a:r>
+              <a:rPr lang="fr-CA" i="1" dirty="0">
+                <a:solidFill>
+                  <a:srgbClr val="0070C0"/>
                 </a:solidFill>
               </a:rPr>
               <a:t>Auguste Le </a:t>
             </a:r>
             <a:r>
-              <a:rPr lang="fr-CA" dirty="0" smtClean="0">
-                <a:solidFill>
-                  <a:schemeClr val="tx1">
-                    <a:lumMod val="50000"/>
-                    <a:lumOff val="50000"/>
-                  </a:schemeClr>
-                </a:solidFill>
-              </a:rPr>
-              <a:t>Blanc)</a:t>
+              <a:rPr lang="fr-CA" i="1" dirty="0" smtClean="0">
+                <a:solidFill>
+                  <a:srgbClr val="0070C0"/>
+                </a:solidFill>
+              </a:rPr>
+              <a:t>Blanc</a:t>
             </a:r>
           </a:p>
           <a:p>
@@ -9628,7 +9652,7 @@
                   </a:schemeClr>
                 </a:solidFill>
               </a:rPr>
-              <a:t> Carl Friedrich Gauss </a:t>
+              <a:t> Pr. Gauss </a:t>
             </a:r>
             <a:r>
               <a:rPr lang="fr-CA" dirty="0" err="1" smtClean="0">
@@ -9694,7 +9718,161 @@
                   </a:schemeClr>
                 </a:solidFill>
               </a:rPr>
-              <a:t>…</a:t>
+              <a:t>… and </a:t>
+            </a:r>
+            <a:r>
+              <a:rPr lang="fr-CA" dirty="0" err="1" smtClean="0">
+                <a:solidFill>
+                  <a:schemeClr val="tx1">
+                    <a:lumMod val="50000"/>
+                    <a:lumOff val="50000"/>
+                  </a:schemeClr>
+                </a:solidFill>
+              </a:rPr>
+              <a:t>when</a:t>
+            </a:r>
+            <a:r>
+              <a:rPr lang="fr-CA" dirty="0" smtClean="0">
+                <a:solidFill>
+                  <a:schemeClr val="tx1">
+                    <a:lumMod val="50000"/>
+                    <a:lumOff val="50000"/>
+                  </a:schemeClr>
+                </a:solidFill>
+              </a:rPr>
+              <a:t> </a:t>
+            </a:r>
+            <a:r>
+              <a:rPr lang="fr-CA" dirty="0" err="1" smtClean="0">
+                <a:solidFill>
+                  <a:schemeClr val="tx1">
+                    <a:lumMod val="50000"/>
+                    <a:lumOff val="50000"/>
+                  </a:schemeClr>
+                </a:solidFill>
+              </a:rPr>
+              <a:t>he</a:t>
+            </a:r>
+            <a:r>
+              <a:rPr lang="fr-CA" dirty="0" smtClean="0">
+                <a:solidFill>
+                  <a:schemeClr val="tx1">
+                    <a:lumMod val="50000"/>
+                    <a:lumOff val="50000"/>
+                  </a:schemeClr>
+                </a:solidFill>
+              </a:rPr>
+              <a:t> </a:t>
+            </a:r>
+            <a:r>
+              <a:rPr lang="fr-CA" dirty="0" err="1" smtClean="0">
+                <a:solidFill>
+                  <a:schemeClr val="tx1">
+                    <a:lumMod val="50000"/>
+                    <a:lumOff val="50000"/>
+                  </a:schemeClr>
+                </a:solidFill>
+              </a:rPr>
+              <a:t>learned</a:t>
+            </a:r>
+            <a:r>
+              <a:rPr lang="fr-CA" dirty="0" smtClean="0">
+                <a:solidFill>
+                  <a:schemeClr val="tx1">
+                    <a:lumMod val="50000"/>
+                    <a:lumOff val="50000"/>
+                  </a:schemeClr>
+                </a:solidFill>
+              </a:rPr>
+              <a:t> </a:t>
+            </a:r>
+            <a:r>
+              <a:rPr lang="fr-CA" dirty="0" err="1" smtClean="0">
+                <a:solidFill>
+                  <a:schemeClr val="tx1">
+                    <a:lumMod val="50000"/>
+                    <a:lumOff val="50000"/>
+                  </a:schemeClr>
+                </a:solidFill>
+              </a:rPr>
+              <a:t>who</a:t>
+            </a:r>
+            <a:r>
+              <a:rPr lang="fr-CA" dirty="0" smtClean="0">
+                <a:solidFill>
+                  <a:schemeClr val="tx1">
+                    <a:lumMod val="50000"/>
+                    <a:lumOff val="50000"/>
+                  </a:schemeClr>
+                </a:solidFill>
+              </a:rPr>
+              <a:t> </a:t>
+            </a:r>
+            <a:r>
+              <a:rPr lang="fr-CA" dirty="0" err="1" smtClean="0">
+                <a:solidFill>
+                  <a:schemeClr val="tx1">
+                    <a:lumMod val="50000"/>
+                    <a:lumOff val="50000"/>
+                  </a:schemeClr>
+                </a:solidFill>
+              </a:rPr>
+              <a:t>she</a:t>
+            </a:r>
+            <a:r>
+              <a:rPr lang="fr-CA" dirty="0" smtClean="0">
+                <a:solidFill>
+                  <a:schemeClr val="tx1">
+                    <a:lumMod val="50000"/>
+                    <a:lumOff val="50000"/>
+                  </a:schemeClr>
+                </a:solidFill>
+              </a:rPr>
+              <a:t> </a:t>
+            </a:r>
+            <a:r>
+              <a:rPr lang="fr-CA" dirty="0" err="1" smtClean="0">
+                <a:solidFill>
+                  <a:schemeClr val="tx1">
+                    <a:lumMod val="50000"/>
+                    <a:lumOff val="50000"/>
+                  </a:schemeClr>
+                </a:solidFill>
+              </a:rPr>
+              <a:t>actually</a:t>
+            </a:r>
+            <a:r>
+              <a:rPr lang="fr-CA" dirty="0" smtClean="0">
+                <a:solidFill>
+                  <a:schemeClr val="tx1">
+                    <a:lumMod val="50000"/>
+                    <a:lumOff val="50000"/>
+                  </a:schemeClr>
+                </a:solidFill>
+              </a:rPr>
+              <a:t> </a:t>
+            </a:r>
+            <a:r>
+              <a:rPr lang="fr-CA" dirty="0" err="1" smtClean="0">
+                <a:solidFill>
+                  <a:schemeClr val="tx1">
+                    <a:lumMod val="50000"/>
+                    <a:lumOff val="50000"/>
+                  </a:schemeClr>
+                </a:solidFill>
+              </a:rPr>
+              <a:t>was</a:t>
+            </a:r>
+            <a:r>
+              <a:rPr lang="fr-CA" dirty="0" smtClean="0">
+                <a:solidFill>
+                  <a:schemeClr val="tx1">
+                    <a:lumMod val="50000"/>
+                    <a:lumOff val="50000"/>
+                  </a:schemeClr>
+                </a:solidFill>
+              </a:rPr>
+              <a:t>.</a:t>
             </a:r>
           </a:p>
           <a:p>

</xml_diff>

<commit_message>
abstraction layers with more details
</commit_message>
<xml_diff>
--- a/UKTAG 20210528 MQTT.pptx
+++ b/UKTAG 20210528 MQTT.pptx
@@ -7626,8 +7626,8 @@
         </p:nvSpPr>
         <p:spPr>
           <a:xfrm>
-            <a:off x="1142480" y="1418363"/>
-            <a:ext cx="7754094" cy="4611968"/>
+            <a:off x="1142480" y="1214325"/>
+            <a:ext cx="7754094" cy="5493812"/>
           </a:xfrm>
           <a:prstGeom prst="rect">
             <a:avLst/>
@@ -7638,6 +7638,34 @@
             <a:spAutoFit/>
           </a:bodyPr>
           <a:lstStyle/>
+          <a:p>
+            <a:pPr>
+              <a:lnSpc>
+                <a:spcPct val="150000"/>
+              </a:lnSpc>
+            </a:pPr>
+            <a:r>
+              <a:rPr lang="en-CA" dirty="0" smtClean="0">
+                <a:solidFill>
+                  <a:schemeClr val="accent6"/>
+                </a:solidFill>
+              </a:rPr>
+              <a:t>Strategy</a:t>
+            </a:r>
+            <a:r>
+              <a:rPr lang="fr-CA" dirty="0" smtClean="0">
+                <a:solidFill>
+                  <a:schemeClr val="accent6"/>
+                </a:solidFill>
+              </a:rPr>
+              <a:t> Pattern</a:t>
+            </a:r>
+            <a:endParaRPr lang="en-CA" dirty="0" smtClean="0">
+              <a:solidFill>
+                <a:schemeClr val="accent6"/>
+              </a:solidFill>
+            </a:endParaRPr>
+          </a:p>
           <a:p>
             <a:pPr marL="285750" indent="-285750">
               <a:lnSpc>
@@ -7647,6 +7675,17 @@
               <a:buChar char="•"/>
             </a:pPr>
             <a:r>
+              <a:rPr lang="en-CA" dirty="0" smtClean="0">
+                <a:solidFill>
+                  <a:schemeClr val="tx1">
+                    <a:lumMod val="50000"/>
+                    <a:lumOff val="50000"/>
+                  </a:schemeClr>
+                </a:solidFill>
+              </a:rPr>
+              <a:t>Connection </a:t>
+            </a:r>
+            <a:r>
               <a:rPr lang="en-CA" dirty="0">
                 <a:solidFill>
                   <a:schemeClr val="tx1">
@@ -7655,7 +7694,7 @@
                   </a:schemeClr>
                 </a:solidFill>
               </a:rPr>
-              <a:t>Connection (show example TCP, Local Queue, WS, …)</a:t>
+              <a:t>(show example TCP, Local Queue, WS, …)</a:t>
             </a:r>
           </a:p>
           <a:p>
@@ -7675,8 +7714,36 @@
                   </a:schemeClr>
                 </a:solidFill>
               </a:rPr>
-              <a:t>Serializer (show example LabVIEW Flatten String, Base64, JSON, …)</a:t>
-            </a:r>
+              <a:t>Tracing / Logging</a:t>
+            </a:r>
+          </a:p>
+          <a:p>
+            <a:pPr>
+              <a:lnSpc>
+                <a:spcPct val="150000"/>
+              </a:lnSpc>
+            </a:pPr>
+            <a:r>
+              <a:rPr lang="en-CA" dirty="0" smtClean="0">
+                <a:solidFill>
+                  <a:schemeClr val="accent6"/>
+                </a:solidFill>
+              </a:rPr>
+              <a:t>Visitor</a:t>
+            </a:r>
+            <a:r>
+              <a:rPr lang="fr-CA" dirty="0" smtClean="0">
+                <a:solidFill>
+                  <a:schemeClr val="accent6"/>
+                </a:solidFill>
+              </a:rPr>
+              <a:t> Pattern</a:t>
+            </a:r>
+            <a:endParaRPr lang="en-CA" dirty="0" smtClean="0">
+              <a:solidFill>
+                <a:schemeClr val="accent6"/>
+              </a:solidFill>
+            </a:endParaRPr>
           </a:p>
           <a:p>
             <a:pPr marL="285750" indent="-285750">
@@ -7687,6 +7754,28 @@
               <a:buChar char="•"/>
             </a:pPr>
             <a:r>
+              <a:rPr lang="en-US" dirty="0" err="1" smtClean="0">
+                <a:solidFill>
+                  <a:schemeClr val="tx1">
+                    <a:lumMod val="50000"/>
+                    <a:lumOff val="50000"/>
+                  </a:schemeClr>
+                </a:solidFill>
+              </a:rPr>
+              <a:t>Serializer</a:t>
+            </a:r>
+            <a:r>
+              <a:rPr lang="en-CA" dirty="0" smtClean="0">
+                <a:solidFill>
+                  <a:schemeClr val="tx1">
+                    <a:lumMod val="50000"/>
+                    <a:lumOff val="50000"/>
+                  </a:schemeClr>
+                </a:solidFill>
+              </a:rPr>
+              <a:t> (LabVIEW </a:t>
+            </a:r>
+            <a:r>
               <a:rPr lang="en-CA" dirty="0">
                 <a:solidFill>
                   <a:schemeClr val="tx1">
@@ -7695,8 +7784,28 @@
                   </a:schemeClr>
                 </a:solidFill>
               </a:rPr>
-              <a:t>Tracing / Logging</a:t>
-            </a:r>
+              <a:t>Flatten String, Base64, JSON, …)</a:t>
+            </a:r>
+          </a:p>
+          <a:p>
+            <a:pPr>
+              <a:lnSpc>
+                <a:spcPct val="150000"/>
+              </a:lnSpc>
+            </a:pPr>
+            <a:r>
+              <a:rPr lang="fr-CA" dirty="0" smtClean="0">
+                <a:solidFill>
+                  <a:schemeClr val="accent6"/>
+                </a:solidFill>
+              </a:rPr>
+              <a:t>Command Pattern</a:t>
+            </a:r>
+            <a:endParaRPr lang="en-CA" dirty="0" smtClean="0">
+              <a:solidFill>
+                <a:schemeClr val="accent6"/>
+              </a:solidFill>
+            </a:endParaRPr>
           </a:p>
           <a:p>
             <a:pPr marL="285750" indent="-285750">
@@ -7707,6 +7816,17 @@
               <a:buChar char="•"/>
             </a:pPr>
             <a:r>
+              <a:rPr lang="en-CA" dirty="0" smtClean="0">
+                <a:solidFill>
+                  <a:schemeClr val="tx1">
+                    <a:lumMod val="50000"/>
+                    <a:lumOff val="50000"/>
+                  </a:schemeClr>
+                </a:solidFill>
+              </a:rPr>
+              <a:t>Control </a:t>
+            </a:r>
+            <a:r>
               <a:rPr lang="en-CA" dirty="0">
                 <a:solidFill>
                   <a:schemeClr val="tx1">
@@ -7715,23 +7835,8 @@
                   </a:schemeClr>
                 </a:solidFill>
               </a:rPr>
-              <a:t>Control Packet (for extending the communication protocol)</a:t>
-            </a:r>
-          </a:p>
-          <a:p>
-            <a:pPr>
-              <a:lnSpc>
-                <a:spcPct val="150000"/>
-              </a:lnSpc>
-            </a:pPr>
-            <a:endParaRPr lang="en-CA" dirty="0">
-              <a:solidFill>
-                <a:schemeClr val="tx1">
-                  <a:lumMod val="50000"/>
-                  <a:lumOff val="50000"/>
-                </a:schemeClr>
-              </a:solidFill>
-            </a:endParaRPr>
+              <a:t>Packet (for extending the communication protocol)</a:t>
+            </a:r>
           </a:p>
           <a:p>
             <a:pPr>
@@ -11704,7 +11809,7 @@
         </p:nvSpPr>
         <p:spPr>
           <a:xfrm>
-            <a:off x="598470" y="2167988"/>
+            <a:off x="598470" y="1825088"/>
             <a:ext cx="2525050" cy="2949910"/>
           </a:xfrm>
           <a:prstGeom prst="rect">
@@ -11869,7 +11974,7 @@
         </p:blipFill>
         <p:spPr>
           <a:xfrm>
-            <a:off x="3447975" y="1982654"/>
+            <a:off x="3447975" y="1639754"/>
             <a:ext cx="8309445" cy="3642641"/>
           </a:xfrm>
           <a:prstGeom prst="rect">
@@ -11877,6 +11982,42 @@
           </a:prstGeom>
         </p:spPr>
       </p:pic>
+      <p:sp>
+        <p:nvSpPr>
+          <p:cNvPr id="10" name="Rectangle 9"/>
+          <p:cNvSpPr/>
+          <p:nvPr/>
+        </p:nvSpPr>
+        <p:spPr>
+          <a:xfrm>
+            <a:off x="834374" y="5816084"/>
+            <a:ext cx="7748275" cy="369332"/>
+          </a:xfrm>
+          <a:prstGeom prst="rect">
+            <a:avLst/>
+          </a:prstGeom>
+        </p:spPr>
+        <p:txBody>
+          <a:bodyPr wrap="none">
+            <a:spAutoFit/>
+          </a:bodyPr>
+          <a:lstStyle/>
+          <a:p>
+            <a:r>
+              <a:rPr lang="en-CA" dirty="0" smtClean="0">
+                <a:solidFill>
+                  <a:schemeClr val="tx1">
+                    <a:lumMod val="50000"/>
+                    <a:lumOff val="50000"/>
+                  </a:schemeClr>
+                </a:solidFill>
+              </a:rPr>
+              <a:t>* New version 3.2.0 of MQTT Broker has been published earlier this week.</a:t>
+            </a:r>
+            <a:endParaRPr lang="en-CA" dirty="0"/>
+          </a:p>
+        </p:txBody>
+      </p:sp>
     </p:spTree>
     <p:extLst>
       <p:ext uri="{BB962C8B-B14F-4D97-AF65-F5344CB8AC3E}">

</xml_diff>

<commit_message>
Finalized demo with Pub-Sub + Request-Reply
</commit_message>
<xml_diff>
--- a/UKTAG 20210528 MQTT.pptx
+++ b/UKTAG 20210528 MQTT.pptx
@@ -8084,45 +8084,30 @@
           </a:p>
         </p:txBody>
       </p:sp>
-      <p:sp>
-        <p:nvSpPr>
-          <p:cNvPr id="3" name="ZoneTexte 2">
-            <a:extLst>
-              <a:ext uri="{FF2B5EF4-FFF2-40B4-BE49-F238E27FC236}">
-                <a16:creationId xmlns:a16="http://schemas.microsoft.com/office/drawing/2014/main" xmlns="" id="{B3DD869D-3CE7-6543-A637-82C1152CC38C}"/>
-              </a:ext>
-            </a:extLst>
-          </p:cNvPr>
-          <p:cNvSpPr txBox="1"/>
+      <p:pic>
+        <p:nvPicPr>
+          <p:cNvPr id="6" name="Picture 5"/>
+          <p:cNvPicPr>
+            <a:picLocks noChangeAspect="1"/>
+          </p:cNvPicPr>
           <p:nvPr/>
-        </p:nvSpPr>
+        </p:nvPicPr>
+        <p:blipFill>
+          <a:blip r:embed="rId2"/>
+          <a:stretch>
+            <a:fillRect/>
+          </a:stretch>
+        </p:blipFill>
         <p:spPr>
           <a:xfrm>
-            <a:off x="2086984" y="2409713"/>
-            <a:ext cx="1790875" cy="369332"/>
+            <a:off x="3524514" y="1671310"/>
+            <a:ext cx="4228571" cy="4219048"/>
           </a:xfrm>
           <a:prstGeom prst="rect">
             <a:avLst/>
           </a:prstGeom>
-          <a:noFill/>
         </p:spPr>
-        <p:txBody>
-          <a:bodyPr wrap="none" rtlCol="0">
-            <a:spAutoFit/>
-          </a:bodyPr>
-          <a:lstStyle/>
-          <a:p>
-            <a:r>
-              <a:rPr lang="fr-FR" dirty="0" err="1"/>
-              <a:t>Example</a:t>
-            </a:r>
-            <a:r>
-              <a:rPr lang="fr-FR" dirty="0"/>
-              <a:t> code…</a:t>
-            </a:r>
-          </a:p>
-        </p:txBody>
-      </p:sp>
+      </p:pic>
     </p:spTree>
     <p:extLst>
       <p:ext uri="{BB962C8B-B14F-4D97-AF65-F5344CB8AC3E}">
@@ -8254,45 +8239,30 @@
           </a:p>
         </p:txBody>
       </p:sp>
-      <p:sp>
-        <p:nvSpPr>
-          <p:cNvPr id="3" name="ZoneTexte 2">
-            <a:extLst>
-              <a:ext uri="{FF2B5EF4-FFF2-40B4-BE49-F238E27FC236}">
-                <a16:creationId xmlns:a16="http://schemas.microsoft.com/office/drawing/2014/main" xmlns="" id="{B3DD869D-3CE7-6543-A637-82C1152CC38C}"/>
-              </a:ext>
-            </a:extLst>
-          </p:cNvPr>
-          <p:cNvSpPr txBox="1"/>
+      <p:pic>
+        <p:nvPicPr>
+          <p:cNvPr id="4" name="Picture 3"/>
+          <p:cNvPicPr>
+            <a:picLocks noChangeAspect="1"/>
+          </p:cNvPicPr>
           <p:nvPr/>
-        </p:nvSpPr>
+        </p:nvPicPr>
+        <p:blipFill>
+          <a:blip r:embed="rId2"/>
+          <a:stretch>
+            <a:fillRect/>
+          </a:stretch>
+        </p:blipFill>
         <p:spPr>
           <a:xfrm>
-            <a:off x="2086984" y="2409713"/>
-            <a:ext cx="1790875" cy="369332"/>
+            <a:off x="3522443" y="1671310"/>
+            <a:ext cx="4228571" cy="4219048"/>
           </a:xfrm>
           <a:prstGeom prst="rect">
             <a:avLst/>
           </a:prstGeom>
-          <a:noFill/>
         </p:spPr>
-        <p:txBody>
-          <a:bodyPr wrap="none" rtlCol="0">
-            <a:spAutoFit/>
-          </a:bodyPr>
-          <a:lstStyle/>
-          <a:p>
-            <a:r>
-              <a:rPr lang="fr-FR" dirty="0" err="1"/>
-              <a:t>Example</a:t>
-            </a:r>
-            <a:r>
-              <a:rPr lang="fr-FR" dirty="0"/>
-              <a:t> code…</a:t>
-            </a:r>
-          </a:p>
-        </p:txBody>
-      </p:sp>
+      </p:pic>
     </p:spTree>
     <p:extLst>
       <p:ext uri="{BB962C8B-B14F-4D97-AF65-F5344CB8AC3E}">
@@ -8781,8 +8751,8 @@
         </p:nvSpPr>
         <p:spPr>
           <a:xfrm>
-            <a:off x="2005496" y="2016434"/>
-            <a:ext cx="6342762" cy="1292662"/>
+            <a:off x="2217922" y="679124"/>
+            <a:ext cx="6441187" cy="3477875"/>
           </a:xfrm>
           <a:prstGeom prst="rect">
             <a:avLst/>
@@ -8795,7 +8765,7 @@
           <a:lstStyle/>
           <a:p>
             <a:r>
-              <a:rPr lang="fr-FR" sz="2400" dirty="0">
+              <a:rPr lang="fr-FR" sz="2800" dirty="0">
                 <a:solidFill>
                   <a:schemeClr val="tx1">
                     <a:lumMod val="50000"/>
@@ -8860,9 +8830,342 @@
                     <a:lumOff val="50000"/>
                   </a:schemeClr>
                 </a:solidFill>
-              </a:rPr>
-              <a:t>https://github.com/LabVIEW-Open-Source/LV-MQTT-Broker</a:t>
-            </a:r>
+                <a:hlinkClick r:id="rId7"/>
+              </a:rPr>
+              <a:t>https://</a:t>
+            </a:r>
+            <a:r>
+              <a:rPr lang="fr-FR" dirty="0" smtClean="0">
+                <a:solidFill>
+                  <a:schemeClr val="tx1">
+                    <a:lumMod val="50000"/>
+                    <a:lumOff val="50000"/>
+                  </a:schemeClr>
+                </a:solidFill>
+                <a:hlinkClick r:id="rId7"/>
+              </a:rPr>
+              <a:t>github.com/LabVIEW-Open-Source/LV-MQTT-Broker</a:t>
+            </a:r>
+            <a:endParaRPr lang="fr-FR" dirty="0" smtClean="0">
+              <a:solidFill>
+                <a:schemeClr val="tx1">
+                  <a:lumMod val="50000"/>
+                  <a:lumOff val="50000"/>
+                </a:schemeClr>
+              </a:solidFill>
+            </a:endParaRPr>
+          </a:p>
+          <a:p>
+            <a:endParaRPr lang="fr-FR" dirty="0">
+              <a:solidFill>
+                <a:schemeClr val="tx1">
+                  <a:lumMod val="50000"/>
+                  <a:lumOff val="50000"/>
+                </a:schemeClr>
+              </a:solidFill>
+            </a:endParaRPr>
+          </a:p>
+          <a:p>
+            <a:endParaRPr lang="fr-FR" dirty="0" smtClean="0">
+              <a:solidFill>
+                <a:schemeClr val="tx1">
+                  <a:lumMod val="50000"/>
+                  <a:lumOff val="50000"/>
+                </a:schemeClr>
+              </a:solidFill>
+            </a:endParaRPr>
+          </a:p>
+          <a:p>
+            <a:r>
+              <a:rPr lang="fr-FR" dirty="0" smtClean="0">
+                <a:solidFill>
+                  <a:schemeClr val="tx1">
+                    <a:lumMod val="50000"/>
+                    <a:lumOff val="50000"/>
+                  </a:schemeClr>
+                </a:solidFill>
+              </a:rPr>
+              <a:t>Or look for </a:t>
+            </a:r>
+            <a:r>
+              <a:rPr lang="fr-FR" dirty="0" err="1" smtClean="0">
+                <a:solidFill>
+                  <a:schemeClr val="tx1">
+                    <a:lumMod val="50000"/>
+                    <a:lumOff val="50000"/>
+                  </a:schemeClr>
+                </a:solidFill>
+              </a:rPr>
+              <a:t>these</a:t>
+            </a:r>
+            <a:r>
+              <a:rPr lang="fr-FR" dirty="0" smtClean="0">
+                <a:solidFill>
+                  <a:schemeClr val="tx1">
+                    <a:lumMod val="50000"/>
+                    <a:lumOff val="50000"/>
+                  </a:schemeClr>
+                </a:solidFill>
+              </a:rPr>
+              <a:t> short </a:t>
+            </a:r>
+            <a:r>
+              <a:rPr lang="fr-FR" dirty="0" err="1" smtClean="0">
+                <a:solidFill>
+                  <a:schemeClr val="tx1">
+                    <a:lumMod val="50000"/>
+                    <a:lumOff val="50000"/>
+                  </a:schemeClr>
+                </a:solidFill>
+              </a:rPr>
+              <a:t>videos</a:t>
+            </a:r>
+            <a:r>
+              <a:rPr lang="fr-FR" dirty="0" smtClean="0">
+                <a:solidFill>
+                  <a:schemeClr val="tx1">
+                    <a:lumMod val="50000"/>
+                    <a:lumOff val="50000"/>
+                  </a:schemeClr>
+                </a:solidFill>
+              </a:rPr>
+              <a:t> on </a:t>
+            </a:r>
+            <a:r>
+              <a:rPr lang="fr-FR" dirty="0" err="1" smtClean="0">
+                <a:solidFill>
+                  <a:schemeClr val="tx1">
+                    <a:lumMod val="50000"/>
+                    <a:lumOff val="50000"/>
+                  </a:schemeClr>
+                </a:solidFill>
+              </a:rPr>
+              <a:t>Youtube</a:t>
+            </a:r>
+            <a:r>
+              <a:rPr lang="fr-FR" dirty="0" smtClean="0">
+                <a:solidFill>
+                  <a:schemeClr val="tx1">
+                    <a:lumMod val="50000"/>
+                    <a:lumOff val="50000"/>
+                  </a:schemeClr>
+                </a:solidFill>
+              </a:rPr>
+              <a:t>!</a:t>
+            </a:r>
+          </a:p>
+          <a:p>
+            <a:endParaRPr lang="en-CA" sz="1400" dirty="0" smtClean="0"/>
+          </a:p>
+          <a:p>
+            <a:pPr lvl="2"/>
+            <a:r>
+              <a:rPr lang="en-CA" sz="1400" dirty="0" smtClean="0">
+                <a:solidFill>
+                  <a:schemeClr val="accent1">
+                    <a:lumMod val="75000"/>
+                  </a:schemeClr>
+                </a:solidFill>
+              </a:rPr>
+              <a:t>MQTT </a:t>
+            </a:r>
+            <a:r>
+              <a:rPr lang="en-CA" sz="1400" dirty="0">
+                <a:solidFill>
+                  <a:schemeClr val="accent1">
+                    <a:lumMod val="75000"/>
+                  </a:schemeClr>
+                </a:solidFill>
+              </a:rPr>
+              <a:t>Broker in </a:t>
+            </a:r>
+            <a:r>
+              <a:rPr lang="en-CA" sz="1400" dirty="0" smtClean="0">
+                <a:solidFill>
+                  <a:schemeClr val="accent1">
+                    <a:lumMod val="75000"/>
+                  </a:schemeClr>
+                </a:solidFill>
+              </a:rPr>
+              <a:t>LabVIEW: 		</a:t>
+            </a:r>
+            <a:r>
+              <a:rPr lang="en-CA" sz="1400" u="sng" dirty="0" smtClean="0">
+                <a:solidFill>
+                  <a:schemeClr val="accent1">
+                    <a:lumMod val="75000"/>
+                  </a:schemeClr>
+                </a:solidFill>
+                <a:hlinkClick r:id="rId8"/>
+              </a:rPr>
+              <a:t>https</a:t>
+            </a:r>
+            <a:r>
+              <a:rPr lang="en-CA" sz="1400" u="sng" dirty="0">
+                <a:solidFill>
+                  <a:schemeClr val="accent1">
+                    <a:lumMod val="75000"/>
+                  </a:schemeClr>
+                </a:solidFill>
+                <a:hlinkClick r:id="rId8"/>
+              </a:rPr>
+              <a:t>://youtu.be/Y-jrwyfD9DU</a:t>
+            </a:r>
+            <a:endParaRPr lang="en-CA" sz="1400" dirty="0">
+              <a:solidFill>
+                <a:schemeClr val="accent1">
+                  <a:lumMod val="75000"/>
+                </a:schemeClr>
+              </a:solidFill>
+            </a:endParaRPr>
+          </a:p>
+          <a:p>
+            <a:pPr lvl="2"/>
+            <a:endParaRPr lang="en-CA" sz="1400" dirty="0" smtClean="0">
+              <a:solidFill>
+                <a:schemeClr val="accent1">
+                  <a:lumMod val="75000"/>
+                </a:schemeClr>
+              </a:solidFill>
+            </a:endParaRPr>
+          </a:p>
+          <a:p>
+            <a:pPr lvl="2"/>
+            <a:r>
+              <a:rPr lang="en-CA" sz="1400" dirty="0">
+                <a:solidFill>
+                  <a:schemeClr val="accent1">
+                    <a:lumMod val="75000"/>
+                  </a:schemeClr>
+                </a:solidFill>
+              </a:rPr>
+              <a:t>TLS Secured </a:t>
+            </a:r>
+            <a:r>
+              <a:rPr lang="en-CA" sz="1400" dirty="0" smtClean="0">
+                <a:solidFill>
+                  <a:schemeClr val="accent1">
+                    <a:lumMod val="75000"/>
+                  </a:schemeClr>
+                </a:solidFill>
+              </a:rPr>
+              <a:t>MQTT: 			</a:t>
+            </a:r>
+            <a:r>
+              <a:rPr lang="en-CA" sz="1400" u="sng" dirty="0" smtClean="0">
+                <a:solidFill>
+                  <a:schemeClr val="accent1">
+                    <a:lumMod val="75000"/>
+                  </a:schemeClr>
+                </a:solidFill>
+                <a:hlinkClick r:id="rId9"/>
+              </a:rPr>
+              <a:t>https</a:t>
+            </a:r>
+            <a:r>
+              <a:rPr lang="en-CA" sz="1400" u="sng" dirty="0">
+                <a:solidFill>
+                  <a:schemeClr val="accent1">
+                    <a:lumMod val="75000"/>
+                  </a:schemeClr>
+                </a:solidFill>
+                <a:hlinkClick r:id="rId9"/>
+              </a:rPr>
+              <a:t>://youtu.be/2-OJ-U6eTmE</a:t>
+            </a:r>
+            <a:endParaRPr lang="en-CA" sz="1400" dirty="0">
+              <a:solidFill>
+                <a:schemeClr val="accent1">
+                  <a:lumMod val="75000"/>
+                </a:schemeClr>
+              </a:solidFill>
+            </a:endParaRPr>
+          </a:p>
+          <a:p>
+            <a:pPr lvl="2"/>
+            <a:r>
+              <a:rPr lang="en-CA" sz="1400" dirty="0">
+                <a:solidFill>
+                  <a:schemeClr val="accent1">
+                    <a:lumMod val="75000"/>
+                  </a:schemeClr>
+                </a:solidFill>
+              </a:rPr>
+              <a:t> </a:t>
+            </a:r>
+          </a:p>
+          <a:p>
+            <a:pPr lvl="2"/>
+            <a:r>
+              <a:rPr lang="en-CA" sz="1400" dirty="0">
+                <a:solidFill>
+                  <a:schemeClr val="accent1">
+                    <a:lumMod val="75000"/>
+                  </a:schemeClr>
+                </a:solidFill>
+              </a:rPr>
+              <a:t>Open </a:t>
+            </a:r>
+            <a:r>
+              <a:rPr lang="en-CA" sz="1400" dirty="0" err="1" smtClean="0">
+                <a:solidFill>
+                  <a:schemeClr val="accent1">
+                    <a:lumMod val="75000"/>
+                  </a:schemeClr>
+                </a:solidFill>
+              </a:rPr>
+              <a:t>Serializer</a:t>
+            </a:r>
+            <a:r>
+              <a:rPr lang="en-CA" sz="1400" dirty="0" smtClean="0">
+                <a:solidFill>
+                  <a:schemeClr val="accent1">
+                    <a:lumMod val="75000"/>
+                  </a:schemeClr>
+                </a:solidFill>
+              </a:rPr>
+              <a:t>: 				</a:t>
+            </a:r>
+            <a:r>
+              <a:rPr lang="en-CA" sz="1400" u="sng" dirty="0" smtClean="0">
+                <a:solidFill>
+                  <a:schemeClr val="accent1">
+                    <a:lumMod val="75000"/>
+                  </a:schemeClr>
+                </a:solidFill>
+                <a:hlinkClick r:id="rId10"/>
+              </a:rPr>
+              <a:t>https</a:t>
+            </a:r>
+            <a:r>
+              <a:rPr lang="en-CA" sz="1400" u="sng" dirty="0">
+                <a:solidFill>
+                  <a:schemeClr val="accent1">
+                    <a:lumMod val="75000"/>
+                  </a:schemeClr>
+                </a:solidFill>
+                <a:hlinkClick r:id="rId10"/>
+              </a:rPr>
+              <a:t>://</a:t>
+            </a:r>
+            <a:r>
+              <a:rPr lang="en-CA" sz="1400" u="sng" dirty="0" smtClean="0">
+                <a:solidFill>
+                  <a:schemeClr val="accent1">
+                    <a:lumMod val="75000"/>
+                  </a:schemeClr>
+                </a:solidFill>
+                <a:hlinkClick r:id="rId10"/>
+              </a:rPr>
+              <a:t>youtu.be/Y_GyZVHIORI</a:t>
+            </a:r>
+            <a:endParaRPr lang="en-CA" sz="1400" dirty="0">
+              <a:solidFill>
+                <a:schemeClr val="accent1">
+                  <a:lumMod val="75000"/>
+                </a:schemeClr>
+              </a:solidFill>
+            </a:endParaRPr>
           </a:p>
         </p:txBody>
       </p:sp>

</xml_diff>